<commit_message>
Added all from local
</commit_message>
<xml_diff>
--- a/Non-Functional Requirements Presentation.pptx
+++ b/Non-Functional Requirements Presentation.pptx
@@ -10,9 +10,7 @@
     <p:sldId id="260" r:id="rId4"/>
     <p:sldId id="261" r:id="rId5"/>
     <p:sldId id="262" r:id="rId6"/>
-    <p:sldId id="257" r:id="rId7"/>
-    <p:sldId id="258" r:id="rId8"/>
-    <p:sldId id="263" r:id="rId9"/>
+    <p:sldId id="263" r:id="rId7"/>
   </p:sldIdLst>
   <p:sldSz cx="12192000" cy="6858000"/>
   <p:notesSz cx="6858000" cy="9144000"/>
@@ -4252,238 +4250,6 @@
       </p:grpSpPr>
       <p:sp>
         <p:nvSpPr>
-          <p:cNvPr id="9" name="TextBox 8">
-            <a:extLst>
-              <a:ext uri="{FF2B5EF4-FFF2-40B4-BE49-F238E27FC236}">
-                <a16:creationId xmlns:a16="http://schemas.microsoft.com/office/drawing/2014/main" id="{6630824B-7173-014E-511B-B8728A053AB8}"/>
-              </a:ext>
-            </a:extLst>
-          </p:cNvPr>
-          <p:cNvSpPr txBox="1"/>
-          <p:nvPr/>
-        </p:nvSpPr>
-        <p:spPr>
-          <a:xfrm>
-            <a:off x="2537012" y="571500"/>
-            <a:ext cx="5764026" cy="369332"/>
-          </a:xfrm>
-          <a:prstGeom prst="rect">
-            <a:avLst/>
-          </a:prstGeom>
-          <a:noFill/>
-        </p:spPr>
-        <p:txBody>
-          <a:bodyPr wrap="square" rtlCol="0">
-            <a:spAutoFit/>
-          </a:bodyPr>
-          <a:lstStyle/>
-          <a:p>
-            <a:r>
-              <a:rPr lang="en-IN" b="1" dirty="0"/>
-              <a:t>           Integration with Payment gateway - PAYTM</a:t>
-            </a:r>
-          </a:p>
-        </p:txBody>
-      </p:sp>
-      <p:pic>
-        <p:nvPicPr>
-          <p:cNvPr id="3" name="Picture 2">
-            <a:extLst>
-              <a:ext uri="{FF2B5EF4-FFF2-40B4-BE49-F238E27FC236}">
-                <a16:creationId xmlns:a16="http://schemas.microsoft.com/office/drawing/2014/main" id="{66F00811-E745-575E-3D07-B2F810AB27E1}"/>
-              </a:ext>
-            </a:extLst>
-          </p:cNvPr>
-          <p:cNvPicPr>
-            <a:picLocks noChangeAspect="1"/>
-          </p:cNvPicPr>
-          <p:nvPr/>
-        </p:nvPicPr>
-        <p:blipFill>
-          <a:blip r:embed="rId2"/>
-          <a:stretch>
-            <a:fillRect/>
-          </a:stretch>
-        </p:blipFill>
-        <p:spPr>
-          <a:xfrm>
-            <a:off x="1891553" y="1005261"/>
-            <a:ext cx="7443399" cy="4290900"/>
-          </a:xfrm>
-          <a:prstGeom prst="rect">
-            <a:avLst/>
-          </a:prstGeom>
-        </p:spPr>
-      </p:pic>
-      <p:sp>
-        <p:nvSpPr>
-          <p:cNvPr id="4" name="TextBox 3">
-            <a:extLst>
-              <a:ext uri="{FF2B5EF4-FFF2-40B4-BE49-F238E27FC236}">
-                <a16:creationId xmlns:a16="http://schemas.microsoft.com/office/drawing/2014/main" id="{E1E590C7-88CC-E2C1-879F-7FB6D67765C6}"/>
-              </a:ext>
-            </a:extLst>
-          </p:cNvPr>
-          <p:cNvSpPr txBox="1"/>
-          <p:nvPr/>
-        </p:nvSpPr>
-        <p:spPr>
-          <a:xfrm>
-            <a:off x="1210235" y="5405718"/>
-            <a:ext cx="9502589" cy="1200329"/>
-          </a:xfrm>
-          <a:prstGeom prst="rect">
-            <a:avLst/>
-          </a:prstGeom>
-          <a:noFill/>
-        </p:spPr>
-        <p:txBody>
-          <a:bodyPr wrap="square" rtlCol="0">
-            <a:spAutoFit/>
-          </a:bodyPr>
-          <a:lstStyle/>
-          <a:p>
-            <a:pPr marL="342900" indent="-342900">
-              <a:buAutoNum type="alphaLcParenR"/>
-            </a:pPr>
-            <a:r>
-              <a:rPr lang="en-IN" dirty="0"/>
-              <a:t>Get the API keys from Paytm dashboard and properties to configure in application properties.</a:t>
-            </a:r>
-          </a:p>
-          <a:p>
-            <a:pPr marL="342900" indent="-342900">
-              <a:buAutoNum type="alphaLcParenR"/>
-            </a:pPr>
-            <a:r>
-              <a:rPr lang="en-IN" dirty="0"/>
-              <a:t>Add the </a:t>
-            </a:r>
-            <a:r>
-              <a:rPr lang="en-IN" dirty="0" err="1"/>
-              <a:t>paytm</a:t>
-            </a:r>
-            <a:r>
-              <a:rPr lang="en-IN" dirty="0"/>
-              <a:t> dependency Jar to pom.xml</a:t>
-            </a:r>
-          </a:p>
-          <a:p>
-            <a:pPr marL="342900" indent="-342900">
-              <a:buAutoNum type="alphaLcParenR"/>
-            </a:pPr>
-            <a:r>
-              <a:rPr lang="en-IN" dirty="0"/>
-              <a:t>Set the controller methods to send the payment request using the checksum and /</a:t>
-            </a:r>
-            <a:r>
-              <a:rPr lang="en-IN" dirty="0" err="1"/>
-              <a:t>pgresponse</a:t>
-            </a:r>
-            <a:r>
-              <a:rPr lang="en-IN" dirty="0"/>
-              <a:t> controller mapping method and validate the </a:t>
-            </a:r>
-            <a:r>
-              <a:rPr lang="en-IN"/>
-              <a:t>checksum again.</a:t>
-            </a:r>
-            <a:endParaRPr lang="en-IN" dirty="0"/>
-          </a:p>
-        </p:txBody>
-      </p:sp>
-    </p:spTree>
-    <p:extLst>
-      <p:ext uri="{BB962C8B-B14F-4D97-AF65-F5344CB8AC3E}">
-        <p14:creationId xmlns:p14="http://schemas.microsoft.com/office/powerpoint/2010/main" val="2046033863"/>
-      </p:ext>
-    </p:extLst>
-  </p:cSld>
-  <p:clrMapOvr>
-    <a:masterClrMapping/>
-  </p:clrMapOvr>
-</p:sld>
-</file>
-
-<file path=ppt/slides/slide7.xml><?xml version="1.0" encoding="utf-8"?>
-<p:sld xmlns:a="http://schemas.openxmlformats.org/drawingml/2006/main" xmlns:r="http://schemas.openxmlformats.org/officeDocument/2006/relationships" xmlns:p="http://schemas.openxmlformats.org/presentationml/2006/main">
-  <p:cSld>
-    <p:spTree>
-      <p:nvGrpSpPr>
-        <p:cNvPr id="1" name=""/>
-        <p:cNvGrpSpPr/>
-        <p:nvPr/>
-      </p:nvGrpSpPr>
-      <p:grpSpPr>
-        <a:xfrm>
-          <a:off x="0" y="0"/>
-          <a:ext cx="0" cy="0"/>
-          <a:chOff x="0" y="0"/>
-          <a:chExt cx="0" cy="0"/>
-        </a:xfrm>
-      </p:grpSpPr>
-      <p:pic>
-        <p:nvPicPr>
-          <p:cNvPr id="7" name="Picture 6">
-            <a:extLst>
-              <a:ext uri="{FF2B5EF4-FFF2-40B4-BE49-F238E27FC236}">
-                <a16:creationId xmlns:a16="http://schemas.microsoft.com/office/drawing/2014/main" id="{B982EC26-1BA6-3424-DEF2-17741704D117}"/>
-              </a:ext>
-            </a:extLst>
-          </p:cNvPr>
-          <p:cNvPicPr>
-            <a:picLocks noChangeAspect="1"/>
-          </p:cNvPicPr>
-          <p:nvPr/>
-        </p:nvPicPr>
-        <p:blipFill>
-          <a:blip r:embed="rId2"/>
-          <a:stretch>
-            <a:fillRect/>
-          </a:stretch>
-        </p:blipFill>
-        <p:spPr>
-          <a:xfrm>
-            <a:off x="1825730" y="520851"/>
-            <a:ext cx="7859222" cy="5611008"/>
-          </a:xfrm>
-          <a:prstGeom prst="rect">
-            <a:avLst/>
-          </a:prstGeom>
-        </p:spPr>
-      </p:pic>
-    </p:spTree>
-    <p:extLst>
-      <p:ext uri="{BB962C8B-B14F-4D97-AF65-F5344CB8AC3E}">
-        <p14:creationId xmlns:p14="http://schemas.microsoft.com/office/powerpoint/2010/main" val="2620711098"/>
-      </p:ext>
-    </p:extLst>
-  </p:cSld>
-  <p:clrMapOvr>
-    <a:masterClrMapping/>
-  </p:clrMapOvr>
-</p:sld>
-</file>
-
-<file path=ppt/slides/slide8.xml><?xml version="1.0" encoding="utf-8"?>
-<p:sld xmlns:a="http://schemas.openxmlformats.org/drawingml/2006/main" xmlns:r="http://schemas.openxmlformats.org/officeDocument/2006/relationships" xmlns:p="http://schemas.openxmlformats.org/presentationml/2006/main">
-  <p:cSld>
-    <p:spTree>
-      <p:nvGrpSpPr>
-        <p:cNvPr id="1" name=""/>
-        <p:cNvGrpSpPr/>
-        <p:nvPr/>
-      </p:nvGrpSpPr>
-      <p:grpSpPr>
-        <a:xfrm>
-          <a:off x="0" y="0"/>
-          <a:ext cx="0" cy="0"/>
-          <a:chOff x="0" y="0"/>
-          <a:chExt cx="0" cy="0"/>
-        </a:xfrm>
-      </p:grpSpPr>
-      <p:sp>
-        <p:nvSpPr>
           <p:cNvPr id="2" name="TextBox 1">
             <a:extLst>
               <a:ext uri="{FF2B5EF4-FFF2-40B4-BE49-F238E27FC236}">
@@ -4513,7 +4279,7 @@
             <a:pPr algn="ctr"/>
             <a:r>
               <a:rPr lang="en-US" sz="1600" u="sng" dirty="0"/>
-              <a:t>Top 10 OSWAP Securities</a:t>
+              <a:t>Top 10 OWSAP Securities</a:t>
             </a:r>
           </a:p>
           <a:p>

</xml_diff>